<commit_message>
Moved example to be larger
</commit_message>
<xml_diff>
--- a/Documents/Poster.pptx
+++ b/Documents/Poster.pptx
@@ -124,6 +124,18 @@
     </p:ext>
   </p:extLst>
 </p:presentation>
+</file>
+
+<file path=ppt/commentAuthors.xml><?xml version="1.0" encoding="utf-8"?>
+<p:cmAuthorLst xmlns:a="http://schemas.openxmlformats.org/drawingml/2006/main" xmlns:r="http://schemas.openxmlformats.org/officeDocument/2006/relationships" xmlns:p="http://schemas.openxmlformats.org/presentationml/2006/main">
+  <p:cmAuthor id="1" name="Kevin Nguyen" initials="KN" lastIdx="1" clrIdx="0">
+    <p:extLst>
+      <p:ext uri="{19B8F6BF-5375-455C-9EA6-DF929625EA0E}">
+        <p15:presenceInfo xmlns:p15="http://schemas.microsoft.com/office/powerpoint/2012/main" userId="ce8229fa-26d4-445b-be67-b4f2dc8d562e" providerId="Windows Live"/>
+      </p:ext>
+    </p:extLst>
+  </p:cmAuthor>
+</p:cmAuthorLst>
 </file>
 
 <file path=ppt/notesMasters/notesMaster1.xml><?xml version="1.0" encoding="utf-8"?>
@@ -3649,7 +3661,7 @@
         <p:spPr bwMode="auto">
           <a:xfrm>
             <a:off x="1755648" y="5604194"/>
-            <a:ext cx="14322552" cy="12243352"/>
+            <a:ext cx="14322552" cy="8046720"/>
           </a:xfrm>
           <a:prstGeom prst="rect">
             <a:avLst/>
@@ -4076,7 +4088,7 @@
         <p:spPr bwMode="auto">
           <a:xfrm>
             <a:off x="1737357" y="31546800"/>
-            <a:ext cx="14331697" cy="6130909"/>
+            <a:ext cx="14331697" cy="6080760"/>
           </a:xfrm>
           <a:prstGeom prst="rect">
             <a:avLst/>
@@ -4226,54 +4238,6 @@
                 <a:latin typeface="Calibri" pitchFamily="34" charset="0"/>
               </a:rPr>
               <a:t>Compare and contrast results from preliminary results</a:t>
-            </a:r>
-          </a:p>
-          <a:p>
-            <a:pPr marL="457200" indent="-457200" eaLnBrk="1" hangingPunct="1">
-              <a:buFont typeface="Arial" charset="0"/>
-              <a:buChar char="•"/>
-            </a:pPr>
-            <a:r>
-              <a:rPr lang="en-US" sz="3360" dirty="0">
-                <a:latin typeface="Calibri" pitchFamily="34" charset="0"/>
-              </a:rPr>
-              <a:t>Currently, we are looking at only electronic data. We are hoping to also look into other categories:</a:t>
-            </a:r>
-          </a:p>
-          <a:p>
-            <a:pPr marL="1200150" lvl="1" indent="-457200" eaLnBrk="1" hangingPunct="1">
-              <a:buFont typeface="Arial" charset="0"/>
-              <a:buChar char="•"/>
-            </a:pPr>
-            <a:r>
-              <a:rPr lang="en-US" sz="3360" dirty="0">
-                <a:latin typeface="Calibri" pitchFamily="34" charset="0"/>
-              </a:rPr>
-              <a:t>Clothing</a:t>
-            </a:r>
-          </a:p>
-          <a:p>
-            <a:pPr marL="1200150" lvl="1" indent="-457200" eaLnBrk="1" hangingPunct="1">
-              <a:buFont typeface="Arial" charset="0"/>
-              <a:buChar char="•"/>
-            </a:pPr>
-            <a:r>
-              <a:rPr lang="en-US" sz="3360" dirty="0">
-                <a:latin typeface="Calibri" pitchFamily="34" charset="0"/>
-              </a:rPr>
-              <a:t>Movies</a:t>
-            </a:r>
-          </a:p>
-          <a:p>
-            <a:pPr marL="1200150" lvl="1" indent="-457200" eaLnBrk="1" hangingPunct="1">
-              <a:buFont typeface="Arial" charset="0"/>
-              <a:buChar char="•"/>
-            </a:pPr>
-            <a:r>
-              <a:rPr lang="en-US" sz="3360" dirty="0">
-                <a:latin typeface="Calibri" pitchFamily="34" charset="0"/>
-              </a:rPr>
-              <a:t>Books</a:t>
             </a:r>
           </a:p>
           <a:p>
@@ -5609,8 +5573,8 @@
         </p:blipFill>
         <p:spPr>
           <a:xfrm>
-            <a:off x="8869677" y="34403142"/>
-            <a:ext cx="6629400" cy="3163689"/>
+            <a:off x="4672474" y="33805771"/>
+            <a:ext cx="8543617" cy="3818245"/>
           </a:xfrm>
           <a:prstGeom prst="rect">
             <a:avLst/>

</xml_diff>